<commit_message>
Fix representation of angle theta of sar geometry in slide 16 of step by step guide
</commit_message>
<xml_diff>
--- a/SFA-stepbystep.pptx
+++ b/SFA-stepbystep.pptx
@@ -217,7 +217,7 @@
           <a:p>
             <a:fld id="{6367D7BE-F40E-47E8-885A-D9C0C03B6B2D}" type="datetimeFigureOut">
               <a:rPr lang="en-US" smtClean="0"/>
-              <a:t>9/5/2023</a:t>
+              <a:t>4/20/2024</a:t>
             </a:fld>
             <a:endParaRPr lang="en-US"/>
           </a:p>
@@ -802,7 +802,7 @@
           <a:p>
             <a:fld id="{950E6B4D-46CF-4F7F-9471-8E030071757B}" type="datetimeFigureOut">
               <a:rPr lang="en-US" smtClean="0"/>
-              <a:t>9/5/2023</a:t>
+              <a:t>4/20/2024</a:t>
             </a:fld>
             <a:endParaRPr lang="en-US"/>
           </a:p>
@@ -1002,7 +1002,7 @@
           <a:p>
             <a:fld id="{950E6B4D-46CF-4F7F-9471-8E030071757B}" type="datetimeFigureOut">
               <a:rPr lang="en-US" smtClean="0"/>
-              <a:t>9/5/2023</a:t>
+              <a:t>4/20/2024</a:t>
             </a:fld>
             <a:endParaRPr lang="en-US"/>
           </a:p>
@@ -1212,7 +1212,7 @@
           <a:p>
             <a:fld id="{950E6B4D-46CF-4F7F-9471-8E030071757B}" type="datetimeFigureOut">
               <a:rPr lang="en-US" smtClean="0"/>
-              <a:t>9/5/2023</a:t>
+              <a:t>4/20/2024</a:t>
             </a:fld>
             <a:endParaRPr lang="en-US"/>
           </a:p>
@@ -1412,7 +1412,7 @@
           <a:p>
             <a:fld id="{950E6B4D-46CF-4F7F-9471-8E030071757B}" type="datetimeFigureOut">
               <a:rPr lang="en-US" smtClean="0"/>
-              <a:t>9/5/2023</a:t>
+              <a:t>4/20/2024</a:t>
             </a:fld>
             <a:endParaRPr lang="en-US"/>
           </a:p>
@@ -1688,7 +1688,7 @@
           <a:p>
             <a:fld id="{950E6B4D-46CF-4F7F-9471-8E030071757B}" type="datetimeFigureOut">
               <a:rPr lang="en-US" smtClean="0"/>
-              <a:t>9/5/2023</a:t>
+              <a:t>4/20/2024</a:t>
             </a:fld>
             <a:endParaRPr lang="en-US"/>
           </a:p>
@@ -1956,7 +1956,7 @@
           <a:p>
             <a:fld id="{950E6B4D-46CF-4F7F-9471-8E030071757B}" type="datetimeFigureOut">
               <a:rPr lang="en-US" smtClean="0"/>
-              <a:t>9/5/2023</a:t>
+              <a:t>4/20/2024</a:t>
             </a:fld>
             <a:endParaRPr lang="en-US"/>
           </a:p>
@@ -2371,7 +2371,7 @@
           <a:p>
             <a:fld id="{950E6B4D-46CF-4F7F-9471-8E030071757B}" type="datetimeFigureOut">
               <a:rPr lang="en-US" smtClean="0"/>
-              <a:t>9/5/2023</a:t>
+              <a:t>4/20/2024</a:t>
             </a:fld>
             <a:endParaRPr lang="en-US"/>
           </a:p>
@@ -2513,7 +2513,7 @@
           <a:p>
             <a:fld id="{950E6B4D-46CF-4F7F-9471-8E030071757B}" type="datetimeFigureOut">
               <a:rPr lang="en-US" smtClean="0"/>
-              <a:t>9/5/2023</a:t>
+              <a:t>4/20/2024</a:t>
             </a:fld>
             <a:endParaRPr lang="en-US"/>
           </a:p>
@@ -2626,7 +2626,7 @@
           <a:p>
             <a:fld id="{950E6B4D-46CF-4F7F-9471-8E030071757B}" type="datetimeFigureOut">
               <a:rPr lang="en-US" smtClean="0"/>
-              <a:t>9/5/2023</a:t>
+              <a:t>4/20/2024</a:t>
             </a:fld>
             <a:endParaRPr lang="en-US"/>
           </a:p>
@@ -2939,7 +2939,7 @@
           <a:p>
             <a:fld id="{950E6B4D-46CF-4F7F-9471-8E030071757B}" type="datetimeFigureOut">
               <a:rPr lang="en-US" smtClean="0"/>
-              <a:t>9/5/2023</a:t>
+              <a:t>4/20/2024</a:t>
             </a:fld>
             <a:endParaRPr lang="en-US"/>
           </a:p>
@@ -3228,7 +3228,7 @@
           <a:p>
             <a:fld id="{950E6B4D-46CF-4F7F-9471-8E030071757B}" type="datetimeFigureOut">
               <a:rPr lang="en-US" smtClean="0"/>
-              <a:t>9/5/2023</a:t>
+              <a:t>4/20/2024</a:t>
             </a:fld>
             <a:endParaRPr lang="en-US"/>
           </a:p>
@@ -3471,7 +3471,7 @@
           <a:p>
             <a:fld id="{950E6B4D-46CF-4F7F-9471-8E030071757B}" type="datetimeFigureOut">
               <a:rPr lang="en-US" smtClean="0"/>
-              <a:t>9/5/2023</a:t>
+              <a:t>4/20/2024</a:t>
             </a:fld>
             <a:endParaRPr lang="en-US"/>
           </a:p>
@@ -10387,45 +10387,6 @@
           </a:p>
         </p:txBody>
       </p:sp>
-      <p:cxnSp>
-        <p:nvCxnSpPr>
-          <p:cNvPr id="50" name="Connecteur droit avec flèche 49">
-            <a:extLst>
-              <a:ext uri="{FF2B5EF4-FFF2-40B4-BE49-F238E27FC236}">
-                <a16:creationId xmlns:a16="http://schemas.microsoft.com/office/drawing/2014/main" id="{97D06239-078D-8002-1B12-7D9416808F1D}"/>
-              </a:ext>
-            </a:extLst>
-          </p:cNvPr>
-          <p:cNvCxnSpPr/>
-          <p:nvPr/>
-        </p:nvCxnSpPr>
-        <p:spPr>
-          <a:xfrm flipH="1">
-            <a:off x="8551856" y="1610527"/>
-            <a:ext cx="1220542" cy="4384467"/>
-          </a:xfrm>
-          <a:prstGeom prst="straightConnector1">
-            <a:avLst/>
-          </a:prstGeom>
-          <a:ln w="76200">
-            <a:tailEnd type="triangle"/>
-          </a:ln>
-        </p:spPr>
-        <p:style>
-          <a:lnRef idx="1">
-            <a:schemeClr val="dk1"/>
-          </a:lnRef>
-          <a:fillRef idx="0">
-            <a:schemeClr val="dk1"/>
-          </a:fillRef>
-          <a:effectRef idx="0">
-            <a:schemeClr val="dk1"/>
-          </a:effectRef>
-          <a:fontRef idx="minor">
-            <a:schemeClr val="tx1"/>
-          </a:fontRef>
-        </p:style>
-      </p:cxnSp>
       <p:sp>
         <p:nvSpPr>
           <p:cNvPr id="51" name="ZoneTexte 50">
@@ -10522,85 +10483,6 @@
       </p:cxnSp>
       <p:sp>
         <p:nvSpPr>
-          <p:cNvPr id="54" name="ZoneTexte 53">
-            <a:extLst>
-              <a:ext uri="{FF2B5EF4-FFF2-40B4-BE49-F238E27FC236}">
-                <a16:creationId xmlns:a16="http://schemas.microsoft.com/office/drawing/2014/main" id="{EE138AE2-CCBE-C3C8-F94A-A0A27D139945}"/>
-              </a:ext>
-            </a:extLst>
-          </p:cNvPr>
-          <p:cNvSpPr txBox="1"/>
-          <p:nvPr/>
-        </p:nvSpPr>
-        <p:spPr>
-          <a:xfrm rot="20815434">
-            <a:off x="6783051" y="3846073"/>
-            <a:ext cx="1528698" cy="369332"/>
-          </a:xfrm>
-          <a:prstGeom prst="rect">
-            <a:avLst/>
-          </a:prstGeom>
-          <a:noFill/>
-        </p:spPr>
-        <p:txBody>
-          <a:bodyPr wrap="square" rtlCol="0">
-            <a:spAutoFit/>
-          </a:bodyPr>
-          <a:lstStyle/>
-          <a:p>
-            <a:r>
-              <a:rPr lang="fr-FR" dirty="0">
-                <a:latin typeface="Bahnschrift Condensed" panose="020B0502040204020203" pitchFamily="34" charset="0"/>
-              </a:rPr>
-              <a:t>LOS</a:t>
-            </a:r>
-            <a:endParaRPr lang="en-US" dirty="0">
-              <a:latin typeface="Bahnschrift Condensed" panose="020B0502040204020203" pitchFamily="34" charset="0"/>
-            </a:endParaRPr>
-          </a:p>
-        </p:txBody>
-      </p:sp>
-      <p:cxnSp>
-        <p:nvCxnSpPr>
-          <p:cNvPr id="56" name="Connecteur droit 55">
-            <a:extLst>
-              <a:ext uri="{FF2B5EF4-FFF2-40B4-BE49-F238E27FC236}">
-                <a16:creationId xmlns:a16="http://schemas.microsoft.com/office/drawing/2014/main" id="{0D5C6106-56EF-2776-CBAB-9CCBD2191D36}"/>
-              </a:ext>
-            </a:extLst>
-          </p:cNvPr>
-          <p:cNvCxnSpPr/>
-          <p:nvPr/>
-        </p:nvCxnSpPr>
-        <p:spPr>
-          <a:xfrm flipH="1" flipV="1">
-            <a:off x="6915738" y="3115509"/>
-            <a:ext cx="2308154" cy="501809"/>
-          </a:xfrm>
-          <a:prstGeom prst="line">
-            <a:avLst/>
-          </a:prstGeom>
-          <a:ln>
-            <a:prstDash val="lgDash"/>
-          </a:ln>
-        </p:spPr>
-        <p:style>
-          <a:lnRef idx="1">
-            <a:schemeClr val="dk1"/>
-          </a:lnRef>
-          <a:fillRef idx="0">
-            <a:schemeClr val="dk1"/>
-          </a:fillRef>
-          <a:effectRef idx="0">
-            <a:schemeClr val="dk1"/>
-          </a:effectRef>
-          <a:fontRef idx="minor">
-            <a:schemeClr val="tx1"/>
-          </a:fontRef>
-        </p:style>
-      </p:cxnSp>
-      <p:sp>
-        <p:nvSpPr>
           <p:cNvPr id="57" name="Forme libre : forme 56">
             <a:extLst>
               <a:ext uri="{FF2B5EF4-FFF2-40B4-BE49-F238E27FC236}">
@@ -10612,9 +10494,9 @@
           <p:nvPr/>
         </p:nvSpPr>
         <p:spPr>
-          <a:xfrm>
-            <a:off x="7780314" y="3334471"/>
-            <a:ext cx="159256" cy="584531"/>
+          <a:xfrm rot="19984778">
+            <a:off x="8948608" y="3704961"/>
+            <a:ext cx="159256" cy="387143"/>
           </a:xfrm>
           <a:custGeom>
             <a:avLst/>
@@ -10689,6 +10571,124 @@
           </a:p>
         </p:txBody>
       </p:sp>
+      <p:cxnSp>
+        <p:nvCxnSpPr>
+          <p:cNvPr id="50" name="Connecteur droit avec flèche 49">
+            <a:extLst>
+              <a:ext uri="{FF2B5EF4-FFF2-40B4-BE49-F238E27FC236}">
+                <a16:creationId xmlns:a16="http://schemas.microsoft.com/office/drawing/2014/main" id="{97D06239-078D-8002-1B12-7D9416808F1D}"/>
+              </a:ext>
+            </a:extLst>
+          </p:cNvPr>
+          <p:cNvCxnSpPr/>
+          <p:nvPr/>
+        </p:nvCxnSpPr>
+        <p:spPr>
+          <a:xfrm flipH="1">
+            <a:off x="8551856" y="1610527"/>
+            <a:ext cx="1220542" cy="4384467"/>
+          </a:xfrm>
+          <a:prstGeom prst="straightConnector1">
+            <a:avLst/>
+          </a:prstGeom>
+          <a:ln w="76200">
+            <a:tailEnd type="triangle"/>
+          </a:ln>
+        </p:spPr>
+        <p:style>
+          <a:lnRef idx="1">
+            <a:schemeClr val="dk1"/>
+          </a:lnRef>
+          <a:fillRef idx="0">
+            <a:schemeClr val="dk1"/>
+          </a:fillRef>
+          <a:effectRef idx="0">
+            <a:schemeClr val="dk1"/>
+          </a:effectRef>
+          <a:fontRef idx="minor">
+            <a:schemeClr val="tx1"/>
+          </a:fontRef>
+        </p:style>
+      </p:cxnSp>
+      <p:sp>
+        <p:nvSpPr>
+          <p:cNvPr id="54" name="ZoneTexte 53">
+            <a:extLst>
+              <a:ext uri="{FF2B5EF4-FFF2-40B4-BE49-F238E27FC236}">
+                <a16:creationId xmlns:a16="http://schemas.microsoft.com/office/drawing/2014/main" id="{EE138AE2-CCBE-C3C8-F94A-A0A27D139945}"/>
+              </a:ext>
+            </a:extLst>
+          </p:cNvPr>
+          <p:cNvSpPr txBox="1"/>
+          <p:nvPr/>
+        </p:nvSpPr>
+        <p:spPr>
+          <a:xfrm rot="20815434">
+            <a:off x="6783051" y="3846073"/>
+            <a:ext cx="1528698" cy="369332"/>
+          </a:xfrm>
+          <a:prstGeom prst="rect">
+            <a:avLst/>
+          </a:prstGeom>
+          <a:noFill/>
+        </p:spPr>
+        <p:txBody>
+          <a:bodyPr wrap="square" rtlCol="0">
+            <a:spAutoFit/>
+          </a:bodyPr>
+          <a:lstStyle/>
+          <a:p>
+            <a:r>
+              <a:rPr lang="fr-FR" dirty="0">
+                <a:latin typeface="Bahnschrift Condensed" panose="020B0502040204020203" pitchFamily="34" charset="0"/>
+              </a:rPr>
+              <a:t>LOS</a:t>
+            </a:r>
+            <a:endParaRPr lang="en-US" dirty="0">
+              <a:latin typeface="Bahnschrift Condensed" panose="020B0502040204020203" pitchFamily="34" charset="0"/>
+            </a:endParaRPr>
+          </a:p>
+        </p:txBody>
+      </p:sp>
+      <p:cxnSp>
+        <p:nvCxnSpPr>
+          <p:cNvPr id="56" name="Connecteur droit 55">
+            <a:extLst>
+              <a:ext uri="{FF2B5EF4-FFF2-40B4-BE49-F238E27FC236}">
+                <a16:creationId xmlns:a16="http://schemas.microsoft.com/office/drawing/2014/main" id="{0D5C6106-56EF-2776-CBAB-9CCBD2191D36}"/>
+              </a:ext>
+            </a:extLst>
+          </p:cNvPr>
+          <p:cNvCxnSpPr/>
+          <p:nvPr/>
+        </p:nvCxnSpPr>
+        <p:spPr>
+          <a:xfrm flipH="1" flipV="1">
+            <a:off x="6915738" y="3115509"/>
+            <a:ext cx="2308154" cy="501809"/>
+          </a:xfrm>
+          <a:prstGeom prst="line">
+            <a:avLst/>
+          </a:prstGeom>
+          <a:ln>
+            <a:prstDash val="lgDash"/>
+          </a:ln>
+        </p:spPr>
+        <p:style>
+          <a:lnRef idx="1">
+            <a:schemeClr val="dk1"/>
+          </a:lnRef>
+          <a:fillRef idx="0">
+            <a:schemeClr val="dk1"/>
+          </a:fillRef>
+          <a:effectRef idx="0">
+            <a:schemeClr val="dk1"/>
+          </a:effectRef>
+          <a:fontRef idx="minor">
+            <a:schemeClr val="tx1"/>
+          </a:fontRef>
+        </p:style>
+      </p:cxnSp>
       <p:sp>
         <p:nvSpPr>
           <p:cNvPr id="58" name="ZoneTexte 57">
@@ -10703,7 +10703,7 @@
         </p:nvSpPr>
         <p:spPr>
           <a:xfrm>
-            <a:off x="6963697" y="3453190"/>
+            <a:off x="8380265" y="3868633"/>
             <a:ext cx="1071500" cy="369332"/>
           </a:xfrm>
           <a:prstGeom prst="rect">
@@ -11152,6 +11152,127 @@
           </a:p>
         </p:txBody>
       </p:sp>
+      <p:cxnSp>
+        <p:nvCxnSpPr>
+          <p:cNvPr id="3" name="Connecteur droit avec flèche 2">
+            <a:extLst>
+              <a:ext uri="{FF2B5EF4-FFF2-40B4-BE49-F238E27FC236}">
+                <a16:creationId xmlns:a16="http://schemas.microsoft.com/office/drawing/2014/main" id="{ECD12886-7895-B537-05FB-C93E6F7D82D5}"/>
+              </a:ext>
+            </a:extLst>
+          </p:cNvPr>
+          <p:cNvCxnSpPr>
+            <a:cxnSpLocks/>
+          </p:cNvCxnSpPr>
+          <p:nvPr/>
+        </p:nvCxnSpPr>
+        <p:spPr>
+          <a:xfrm>
+            <a:off x="9190324" y="3639695"/>
+            <a:ext cx="76767" cy="1607778"/>
+          </a:xfrm>
+          <a:prstGeom prst="straightConnector1">
+            <a:avLst/>
+          </a:prstGeom>
+          <a:ln w="57150">
+            <a:solidFill>
+              <a:schemeClr val="tx1"/>
+            </a:solidFill>
+            <a:headEnd type="none" w="med" len="med"/>
+            <a:tailEnd type="none" w="med" len="med"/>
+          </a:ln>
+        </p:spPr>
+        <p:style>
+          <a:lnRef idx="1">
+            <a:schemeClr val="accent1"/>
+          </a:lnRef>
+          <a:fillRef idx="0">
+            <a:schemeClr val="accent1"/>
+          </a:fillRef>
+          <a:effectRef idx="0">
+            <a:schemeClr val="accent1"/>
+          </a:effectRef>
+          <a:fontRef idx="minor">
+            <a:schemeClr val="tx1"/>
+          </a:fontRef>
+        </p:style>
+      </p:cxnSp>
+      <p:cxnSp>
+        <p:nvCxnSpPr>
+          <p:cNvPr id="10" name="Connecteur droit 9">
+            <a:extLst>
+              <a:ext uri="{FF2B5EF4-FFF2-40B4-BE49-F238E27FC236}">
+                <a16:creationId xmlns:a16="http://schemas.microsoft.com/office/drawing/2014/main" id="{FF7B2AB7-64B0-099D-B235-ADCE0B3869C6}"/>
+              </a:ext>
+            </a:extLst>
+          </p:cNvPr>
+          <p:cNvCxnSpPr>
+            <a:cxnSpLocks/>
+          </p:cNvCxnSpPr>
+          <p:nvPr/>
+        </p:nvCxnSpPr>
+        <p:spPr>
+          <a:xfrm flipH="1" flipV="1">
+            <a:off x="9015686" y="3751041"/>
+            <a:ext cx="170197" cy="29677"/>
+          </a:xfrm>
+          <a:prstGeom prst="line">
+            <a:avLst/>
+          </a:prstGeom>
+        </p:spPr>
+        <p:style>
+          <a:lnRef idx="1">
+            <a:schemeClr val="dk1"/>
+          </a:lnRef>
+          <a:fillRef idx="0">
+            <a:schemeClr val="dk1"/>
+          </a:fillRef>
+          <a:effectRef idx="0">
+            <a:schemeClr val="dk1"/>
+          </a:effectRef>
+          <a:fontRef idx="minor">
+            <a:schemeClr val="tx1"/>
+          </a:fontRef>
+        </p:style>
+      </p:cxnSp>
+      <p:cxnSp>
+        <p:nvCxnSpPr>
+          <p:cNvPr id="12" name="Connecteur droit 11">
+            <a:extLst>
+              <a:ext uri="{FF2B5EF4-FFF2-40B4-BE49-F238E27FC236}">
+                <a16:creationId xmlns:a16="http://schemas.microsoft.com/office/drawing/2014/main" id="{9DC6084E-6253-5FAB-40E4-B61C981556A0}"/>
+              </a:ext>
+            </a:extLst>
+          </p:cNvPr>
+          <p:cNvCxnSpPr>
+            <a:cxnSpLocks/>
+          </p:cNvCxnSpPr>
+          <p:nvPr/>
+        </p:nvCxnSpPr>
+        <p:spPr>
+          <a:xfrm flipH="1">
+            <a:off x="9012444" y="3563653"/>
+            <a:ext cx="6485" cy="194798"/>
+          </a:xfrm>
+          <a:prstGeom prst="line">
+            <a:avLst/>
+          </a:prstGeom>
+        </p:spPr>
+        <p:style>
+          <a:lnRef idx="1">
+            <a:schemeClr val="dk1"/>
+          </a:lnRef>
+          <a:fillRef idx="0">
+            <a:schemeClr val="dk1"/>
+          </a:fillRef>
+          <a:effectRef idx="0">
+            <a:schemeClr val="dk1"/>
+          </a:effectRef>
+          <a:fontRef idx="minor">
+            <a:schemeClr val="tx1"/>
+          </a:fontRef>
+        </p:style>
+      </p:cxnSp>
     </p:spTree>
     <p:extLst>
       <p:ext uri="{BB962C8B-B14F-4D97-AF65-F5344CB8AC3E}">

</xml_diff>